<commit_message>
add notes and end slide to final presentation
</commit_message>
<xml_diff>
--- a/02-introduction-presentation/complete_final.pptx
+++ b/02-introduction-presentation/complete_final.pptx
@@ -5,10 +5,10 @@
     <p:sldMasterId id="2147483648" r:id="rId1"/>
   </p:sldMasterIdLst>
   <p:notesMasterIdLst>
-    <p:notesMasterId r:id="rId17"/>
+    <p:notesMasterId r:id="rId18"/>
   </p:notesMasterIdLst>
   <p:handoutMasterIdLst>
-    <p:handoutMasterId r:id="rId18"/>
+    <p:handoutMasterId r:id="rId19"/>
   </p:handoutMasterIdLst>
   <p:sldIdLst>
     <p:sldId id="258" r:id="rId2"/>
@@ -26,6 +26,7 @@
     <p:sldId id="270" r:id="rId14"/>
     <p:sldId id="271" r:id="rId15"/>
     <p:sldId id="272" r:id="rId16"/>
+    <p:sldId id="273" r:id="rId17"/>
   </p:sldIdLst>
   <p:sldSz cx="9144000" cy="6858000" type="screen4x3"/>
   <p:notesSz cx="6858000" cy="9144000"/>
@@ -148,6 +149,7 @@
             <p14:sldId id="270"/>
             <p14:sldId id="271"/>
             <p14:sldId id="272"/>
+            <p14:sldId id="273"/>
           </p14:sldIdLst>
         </p14:section>
       </p14:sectionLst>
@@ -279,7 +281,7 @@
             <a:fld id="{350B7780-B50B-474C-85C6-0B4009B6F014}" type="datetimeFigureOut">
               <a:rPr lang="de-DE" smtClean="0"/>
               <a:pPr/>
-              <a:t>08.05.2019</a:t>
+              <a:t>09.05.2019</a:t>
             </a:fld>
             <a:endParaRPr lang="de-DE"/>
           </a:p>
@@ -441,7 +443,7 @@
             <a:fld id="{19FFB102-D3AF-431C-A902-ADE5B2A48608}" type="datetimeFigureOut">
               <a:rPr lang="de-DE" smtClean="0"/>
               <a:pPr/>
-              <a:t>08.05.2019</a:t>
+              <a:t>09.05.2019</a:t>
             </a:fld>
             <a:endParaRPr lang="de-DE"/>
           </a:p>
@@ -835,7 +837,17 @@
           <a:bodyPr/>
           <a:lstStyle/>
           <a:p>
-            <a:endParaRPr lang="de-DE" dirty="0"/>
+            <a:r>
+              <a:rPr lang="de-DE"/>
+              <a:t>Für Projektplan Meilensteine festgelegt/datiert -&gt; Gantt-Diagramm</a:t>
+            </a:r>
+          </a:p>
+          <a:p>
+            <a:r>
+              <a:rPr lang="de-DE"/>
+              <a:t>Jeder Meilenstein mit Puffer von 1-2 Wochen</a:t>
+            </a:r>
+            <a:endParaRPr lang="en-US"/>
           </a:p>
         </p:txBody>
       </p:sp>
@@ -857,7 +869,7 @@
             <a:fld id="{C7C1E745-E753-4EB9-8485-6560CD204B37}" type="slidenum">
               <a:rPr lang="de-DE" smtClean="0"/>
               <a:pPr/>
-              <a:t>13</a:t>
+              <a:t>10</a:t>
             </a:fld>
             <a:endParaRPr lang="de-DE"/>
           </a:p>
@@ -866,7 +878,7 @@
     </p:spTree>
     <p:extLst>
       <p:ext uri="{BB962C8B-B14F-4D97-AF65-F5344CB8AC3E}">
-        <p14:creationId xmlns:p14="http://schemas.microsoft.com/office/powerpoint/2010/main" val="1999361582"/>
+        <p14:creationId xmlns:p14="http://schemas.microsoft.com/office/powerpoint/2010/main" val="183982486"/>
       </p:ext>
     </p:extLst>
   </p:cSld>
@@ -921,7 +933,187 @@
           <a:lstStyle/>
           <a:p>
             <a:r>
-              <a:rPr lang="de-DE" dirty="0"/>
+              <a:rPr lang="de-DE"/>
+              <a:t>User Stories mit verschiedenen Stakeholdern</a:t>
+            </a:r>
+            <a:endParaRPr lang="en-US"/>
+          </a:p>
+        </p:txBody>
+      </p:sp>
+      <p:sp>
+        <p:nvSpPr>
+          <p:cNvPr id="4" name="Foliennummernplatzhalter 3"/>
+          <p:cNvSpPr>
+            <a:spLocks noGrp="1"/>
+          </p:cNvSpPr>
+          <p:nvPr>
+            <p:ph type="sldNum" sz="quarter" idx="5"/>
+          </p:nvPr>
+        </p:nvSpPr>
+        <p:spPr/>
+        <p:txBody>
+          <a:bodyPr/>
+          <a:lstStyle/>
+          <a:p>
+            <a:fld id="{C7C1E745-E753-4EB9-8485-6560CD204B37}" type="slidenum">
+              <a:rPr lang="de-DE" smtClean="0"/>
+              <a:pPr/>
+              <a:t>11</a:t>
+            </a:fld>
+            <a:endParaRPr lang="de-DE"/>
+          </a:p>
+        </p:txBody>
+      </p:sp>
+    </p:spTree>
+    <p:extLst>
+      <p:ext uri="{BB962C8B-B14F-4D97-AF65-F5344CB8AC3E}">
+        <p14:creationId xmlns:p14="http://schemas.microsoft.com/office/powerpoint/2010/main" val="314729334"/>
+      </p:ext>
+    </p:extLst>
+  </p:cSld>
+  <p:clrMapOvr>
+    <a:masterClrMapping/>
+  </p:clrMapOvr>
+</p:notes>
+</file>
+
+<file path=ppt/notesSlides/notesSlide4.xml><?xml version="1.0" encoding="utf-8"?>
+<p:notes xmlns:a="http://schemas.openxmlformats.org/drawingml/2006/main" xmlns:r="http://schemas.openxmlformats.org/officeDocument/2006/relationships" xmlns:p="http://schemas.openxmlformats.org/presentationml/2006/main">
+  <p:cSld>
+    <p:spTree>
+      <p:nvGrpSpPr>
+        <p:cNvPr id="1" name=""/>
+        <p:cNvGrpSpPr/>
+        <p:nvPr/>
+      </p:nvGrpSpPr>
+      <p:grpSpPr>
+        <a:xfrm>
+          <a:off x="0" y="0"/>
+          <a:ext cx="0" cy="0"/>
+          <a:chOff x="0" y="0"/>
+          <a:chExt cx="0" cy="0"/>
+        </a:xfrm>
+      </p:grpSpPr>
+      <p:sp>
+        <p:nvSpPr>
+          <p:cNvPr id="2" name="Folienbildplatzhalter 1"/>
+          <p:cNvSpPr>
+            <a:spLocks noGrp="1" noRot="1" noChangeAspect="1"/>
+          </p:cNvSpPr>
+          <p:nvPr>
+            <p:ph type="sldImg"/>
+          </p:nvPr>
+        </p:nvSpPr>
+        <p:spPr/>
+      </p:sp>
+      <p:sp>
+        <p:nvSpPr>
+          <p:cNvPr id="3" name="Notizenplatzhalter 2"/>
+          <p:cNvSpPr>
+            <a:spLocks noGrp="1"/>
+          </p:cNvSpPr>
+          <p:nvPr>
+            <p:ph type="body" idx="1"/>
+          </p:nvPr>
+        </p:nvSpPr>
+        <p:spPr/>
+        <p:txBody>
+          <a:bodyPr/>
+          <a:lstStyle/>
+          <a:p>
+            <a:endParaRPr lang="de-DE" dirty="0"/>
+          </a:p>
+        </p:txBody>
+      </p:sp>
+      <p:sp>
+        <p:nvSpPr>
+          <p:cNvPr id="4" name="Foliennummernplatzhalter 3"/>
+          <p:cNvSpPr>
+            <a:spLocks noGrp="1"/>
+          </p:cNvSpPr>
+          <p:nvPr>
+            <p:ph type="sldNum" sz="quarter" idx="5"/>
+          </p:nvPr>
+        </p:nvSpPr>
+        <p:spPr/>
+        <p:txBody>
+          <a:bodyPr/>
+          <a:lstStyle/>
+          <a:p>
+            <a:fld id="{C7C1E745-E753-4EB9-8485-6560CD204B37}" type="slidenum">
+              <a:rPr lang="de-DE" smtClean="0"/>
+              <a:pPr/>
+              <a:t>13</a:t>
+            </a:fld>
+            <a:endParaRPr lang="de-DE"/>
+          </a:p>
+        </p:txBody>
+      </p:sp>
+    </p:spTree>
+    <p:extLst>
+      <p:ext uri="{BB962C8B-B14F-4D97-AF65-F5344CB8AC3E}">
+        <p14:creationId xmlns:p14="http://schemas.microsoft.com/office/powerpoint/2010/main" val="1999361582"/>
+      </p:ext>
+    </p:extLst>
+  </p:cSld>
+  <p:clrMapOvr>
+    <a:masterClrMapping/>
+  </p:clrMapOvr>
+</p:notes>
+</file>
+
+<file path=ppt/notesSlides/notesSlide5.xml><?xml version="1.0" encoding="utf-8"?>
+<p:notes xmlns:a="http://schemas.openxmlformats.org/drawingml/2006/main" xmlns:r="http://schemas.openxmlformats.org/officeDocument/2006/relationships" xmlns:p="http://schemas.openxmlformats.org/presentationml/2006/main">
+  <p:cSld>
+    <p:spTree>
+      <p:nvGrpSpPr>
+        <p:cNvPr id="1" name=""/>
+        <p:cNvGrpSpPr/>
+        <p:nvPr/>
+      </p:nvGrpSpPr>
+      <p:grpSpPr>
+        <a:xfrm>
+          <a:off x="0" y="0"/>
+          <a:ext cx="0" cy="0"/>
+          <a:chOff x="0" y="0"/>
+          <a:chExt cx="0" cy="0"/>
+        </a:xfrm>
+      </p:grpSpPr>
+      <p:sp>
+        <p:nvSpPr>
+          <p:cNvPr id="2" name="Folienbildplatzhalter 1"/>
+          <p:cNvSpPr>
+            <a:spLocks noGrp="1" noRot="1" noChangeAspect="1"/>
+          </p:cNvSpPr>
+          <p:nvPr>
+            <p:ph type="sldImg"/>
+          </p:nvPr>
+        </p:nvSpPr>
+        <p:spPr/>
+      </p:sp>
+      <p:sp>
+        <p:nvSpPr>
+          <p:cNvPr id="3" name="Notizenplatzhalter 2"/>
+          <p:cNvSpPr>
+            <a:spLocks noGrp="1"/>
+          </p:cNvSpPr>
+          <p:nvPr>
+            <p:ph type="body" idx="1"/>
+          </p:nvPr>
+        </p:nvSpPr>
+        <p:spPr/>
+        <p:txBody>
+          <a:bodyPr/>
+          <a:lstStyle/>
+          <a:p>
+            <a:r>
+              <a:rPr lang="de-DE"/>
+              <a:t>Kanban-System</a:t>
+            </a:r>
+          </a:p>
+          <a:p>
+            <a:r>
+              <a:rPr lang="de-DE"/>
               <a:t>Design </a:t>
             </a:r>
             <a:r>
@@ -2899,7 +3091,7 @@
           </p:nvPr>
         </p:nvPicPr>
         <p:blipFill>
-          <a:blip r:embed="rId2"/>
+          <a:blip r:embed="rId3"/>
           <a:stretch>
             <a:fillRect/>
           </a:stretch>
@@ -3633,6 +3825,151 @@
     <p:extLst>
       <p:ext uri="{BB962C8B-B14F-4D97-AF65-F5344CB8AC3E}">
         <p14:creationId xmlns:p14="http://schemas.microsoft.com/office/powerpoint/2010/main" val="3924698359"/>
+      </p:ext>
+    </p:extLst>
+  </p:cSld>
+  <p:clrMapOvr>
+    <a:masterClrMapping/>
+  </p:clrMapOvr>
+</p:sld>
+</file>
+
+<file path=ppt/slides/slide16.xml><?xml version="1.0" encoding="utf-8"?>
+<p:sld xmlns:a="http://schemas.openxmlformats.org/drawingml/2006/main" xmlns:r="http://schemas.openxmlformats.org/officeDocument/2006/relationships" xmlns:p="http://schemas.openxmlformats.org/presentationml/2006/main">
+  <p:cSld>
+    <p:spTree>
+      <p:nvGrpSpPr>
+        <p:cNvPr id="1" name=""/>
+        <p:cNvGrpSpPr/>
+        <p:nvPr/>
+      </p:nvGrpSpPr>
+      <p:grpSpPr>
+        <a:xfrm>
+          <a:off x="0" y="0"/>
+          <a:ext cx="0" cy="0"/>
+          <a:chOff x="0" y="0"/>
+          <a:chExt cx="0" cy="0"/>
+        </a:xfrm>
+      </p:grpSpPr>
+      <p:sp>
+        <p:nvSpPr>
+          <p:cNvPr id="5" name="Titel 4">
+            <a:extLst>
+              <a:ext uri="{FF2B5EF4-FFF2-40B4-BE49-F238E27FC236}">
+                <a16:creationId xmlns:a16="http://schemas.microsoft.com/office/drawing/2014/main" id="{A9E25F73-BBB9-4273-9D61-52E3853D1486}"/>
+              </a:ext>
+            </a:extLst>
+          </p:cNvPr>
+          <p:cNvSpPr>
+            <a:spLocks noGrp="1"/>
+          </p:cNvSpPr>
+          <p:nvPr>
+            <p:ph type="ctrTitle"/>
+          </p:nvPr>
+        </p:nvSpPr>
+        <p:spPr>
+          <a:xfrm>
+            <a:off x="972716" y="2155040"/>
+            <a:ext cx="7198568" cy="1470025"/>
+          </a:xfrm>
+        </p:spPr>
+        <p:txBody>
+          <a:bodyPr/>
+          <a:lstStyle/>
+          <a:p>
+            <a:pPr algn="ctr"/>
+            <a:r>
+              <a:rPr lang="de-DE" sz="3200"/>
+              <a:t>Vielen Dank </a:t>
+            </a:r>
+            <a:br>
+              <a:rPr lang="de-DE" sz="3200"/>
+            </a:br>
+            <a:r>
+              <a:rPr lang="de-DE" sz="3200"/>
+              <a:t>für Ihre Aufmerksamkeit!</a:t>
+            </a:r>
+            <a:endParaRPr lang="en-US" sz="2000"/>
+          </a:p>
+        </p:txBody>
+      </p:sp>
+      <p:sp>
+        <p:nvSpPr>
+          <p:cNvPr id="4" name="Foliennummernplatzhalter 3">
+            <a:extLst>
+              <a:ext uri="{FF2B5EF4-FFF2-40B4-BE49-F238E27FC236}">
+                <a16:creationId xmlns:a16="http://schemas.microsoft.com/office/drawing/2014/main" id="{023B0654-CF5C-4BFA-B807-7416F14A9D9E}"/>
+              </a:ext>
+            </a:extLst>
+          </p:cNvPr>
+          <p:cNvSpPr>
+            <a:spLocks noGrp="1"/>
+          </p:cNvSpPr>
+          <p:nvPr>
+            <p:ph type="sldNum" sz="quarter" idx="4294967295"/>
+          </p:nvPr>
+        </p:nvSpPr>
+        <p:spPr>
+          <a:xfrm>
+            <a:off x="7086600" y="6356350"/>
+            <a:ext cx="2057400" cy="365125"/>
+          </a:xfrm>
+        </p:spPr>
+        <p:txBody>
+          <a:bodyPr/>
+          <a:lstStyle/>
+          <a:p>
+            <a:fld id="{9BBAE405-9238-4745-AB75-58013C9D9462}" type="slidenum">
+              <a:rPr lang="de-DE" smtClean="0"/>
+              <a:t>16</a:t>
+            </a:fld>
+            <a:endParaRPr lang="de-DE" dirty="0"/>
+          </a:p>
+        </p:txBody>
+      </p:sp>
+      <p:pic>
+        <p:nvPicPr>
+          <p:cNvPr id="8" name="Grafik 7">
+            <a:extLst>
+              <a:ext uri="{FF2B5EF4-FFF2-40B4-BE49-F238E27FC236}">
+                <a16:creationId xmlns:a16="http://schemas.microsoft.com/office/drawing/2014/main" id="{06A52890-7B81-42F9-A240-0FE883FE3C40}"/>
+              </a:ext>
+            </a:extLst>
+          </p:cNvPr>
+          <p:cNvPicPr>
+            <a:picLocks noChangeAspect="1"/>
+          </p:cNvPicPr>
+          <p:nvPr/>
+        </p:nvPicPr>
+        <p:blipFill>
+          <a:blip r:embed="rId2" cstate="print">
+            <a:extLst>
+              <a:ext uri="{28A0092B-C50C-407E-A947-70E740481C1C}">
+                <a14:useLocalDpi xmlns:a14="http://schemas.microsoft.com/office/drawing/2010/main" val="0"/>
+              </a:ext>
+              <a:ext uri="{837473B0-CC2E-450A-ABE3-18F120FF3D39}">
+                <a1611:picAttrSrcUrl xmlns:a1611="http://schemas.microsoft.com/office/drawing/2016/11/main" r:id="rId3"/>
+              </a:ext>
+            </a:extLst>
+          </a:blip>
+          <a:stretch>
+            <a:fillRect/>
+          </a:stretch>
+        </p:blipFill>
+        <p:spPr>
+          <a:xfrm>
+            <a:off x="3469568" y="3625065"/>
+            <a:ext cx="2204864" cy="2204864"/>
+          </a:xfrm>
+          <a:prstGeom prst="rect">
+            <a:avLst/>
+          </a:prstGeom>
+        </p:spPr>
+      </p:pic>
+    </p:spTree>
+    <p:extLst>
+      <p:ext uri="{BB962C8B-B14F-4D97-AF65-F5344CB8AC3E}">
+        <p14:creationId xmlns:p14="http://schemas.microsoft.com/office/powerpoint/2010/main" val="2109670464"/>
       </p:ext>
     </p:extLst>
   </p:cSld>

</xml_diff>